<commit_message>
made my testing script
</commit_message>
<xml_diff>
--- a/Making Finals not as Bad.pptx
+++ b/Making Finals not as Bad.pptx
@@ -114,6 +114,11 @@
       </a:defRPr>
     </a:lvl9pPr>
   </p:defaultTextStyle>
+  <p:extLst>
+    <p:ext uri="{EFAFB233-063F-42B5-8137-9DF3F51BA10A}">
+      <p15:sldGuideLst xmlns:p15="http://schemas.microsoft.com/office/powerpoint/2012/main"/>
+    </p:ext>
+  </p:extLst>
 </p:presentation>
 </file>
 
@@ -7351,7 +7356,6 @@
               <a:rPr lang="en-US" dirty="0" smtClean="0"/>
               <a:t>Beers </a:t>
             </a:r>
-            <a:endParaRPr lang="en-US" dirty="0" smtClean="0"/>
           </a:p>
         </p:txBody>
       </p:sp>

</xml_diff>

<commit_message>
finalized powerpoint with data
</commit_message>
<xml_diff>
--- a/Making Finals not as Bad.pptx
+++ b/Making Finals not as Bad.pptx
@@ -16,8 +16,9 @@
     <p:sldId id="264" r:id="rId10"/>
     <p:sldId id="265" r:id="rId11"/>
     <p:sldId id="266" r:id="rId12"/>
-    <p:sldId id="267" r:id="rId13"/>
-    <p:sldId id="268" r:id="rId14"/>
+    <p:sldId id="269" r:id="rId13"/>
+    <p:sldId id="267" r:id="rId14"/>
+    <p:sldId id="268" r:id="rId15"/>
   </p:sldIdLst>
   <p:sldSz cx="12192000" cy="6858000"/>
   <p:notesSz cx="6858000" cy="9144000"/>
@@ -130,6 +131,13 @@
     <p:extLst>
       <p:ext uri="{19B8F6BF-5375-455C-9EA6-DF929625EA0E}">
         <p15:presenceInfo xmlns:p15="http://schemas.microsoft.com/office/powerpoint/2012/main" userId="2654c76b6fee8a95" providerId="Windows Live"/>
+      </p:ext>
+    </p:extLst>
+  </p:cmAuthor>
+  <p:cmAuthor id="2" name="Jesse Schloss" initials="JS" lastIdx="1" clrIdx="1">
+    <p:extLst>
+      <p:ext uri="{19B8F6BF-5375-455C-9EA6-DF929625EA0E}">
+        <p15:presenceInfo xmlns:p15="http://schemas.microsoft.com/office/powerpoint/2012/main" userId="Jesse Schloss" providerId="None"/>
       </p:ext>
     </p:extLst>
   </p:cmAuthor>
@@ -6460,14 +6468,14 @@
       </p:grpSpPr>
       <p:sp>
         <p:nvSpPr>
-          <p:cNvPr id="3" name="TextBox 2"/>
+          <p:cNvPr id="2" name="TextBox 1"/>
           <p:cNvSpPr txBox="1"/>
           <p:nvPr/>
         </p:nvSpPr>
         <p:spPr>
           <a:xfrm>
-            <a:off x="2688608" y="764273"/>
-            <a:ext cx="6619164" cy="646331"/>
+            <a:off x="1669143" y="435429"/>
+            <a:ext cx="9550400" cy="3447098"/>
           </a:xfrm>
           <a:prstGeom prst="rect">
             <a:avLst/>
@@ -6482,96 +6490,69 @@
           <a:p>
             <a:pPr algn="ctr"/>
             <a:r>
-              <a:rPr lang="en-US" sz="3600" dirty="0" smtClean="0"/>
-              <a:t>Improvements to  be made</a:t>
-            </a:r>
-            <a:endParaRPr lang="en-US" sz="3600" dirty="0"/>
-          </a:p>
-        </p:txBody>
-      </p:sp>
-      <p:sp>
-        <p:nvSpPr>
-          <p:cNvPr id="4" name="TextBox 3"/>
-          <p:cNvSpPr txBox="1"/>
-          <p:nvPr/>
-        </p:nvSpPr>
-        <p:spPr>
-          <a:xfrm>
-            <a:off x="2470245" y="1787857"/>
-            <a:ext cx="7547212" cy="2677656"/>
-          </a:xfrm>
-          <a:prstGeom prst="rect">
-            <a:avLst/>
-          </a:prstGeom>
-          <a:noFill/>
-        </p:spPr>
-        <p:txBody>
-          <a:bodyPr wrap="square" rtlCol="0">
-            <a:spAutoFit/>
-          </a:bodyPr>
-          <a:lstStyle/>
-          <a:p>
-            <a:pPr marL="285750" indent="-285750">
-              <a:buFont typeface="Arial" panose="020B0604020202020204" pitchFamily="34" charset="0"/>
-              <a:buChar char="•"/>
-            </a:pPr>
+              <a:rPr lang="en-US" sz="3200" dirty="0" smtClean="0"/>
+              <a:t>Results</a:t>
+            </a:r>
+          </a:p>
+          <a:p>
+            <a:endParaRPr lang="en-US" dirty="0"/>
+          </a:p>
+          <a:p>
             <a:r>
               <a:rPr lang="en-US" sz="2400" dirty="0" smtClean="0"/>
-              <a:t>More efficient</a:t>
-            </a:r>
-          </a:p>
-          <a:p>
-            <a:pPr marL="285750" indent="-285750">
-              <a:buFont typeface="Arial" panose="020B0604020202020204" pitchFamily="34" charset="0"/>
-              <a:buChar char="•"/>
-            </a:pPr>
+              <a:t>Initial Badness: 27529</a:t>
+            </a:r>
+          </a:p>
+          <a:p>
             <a:r>
               <a:rPr lang="en-US" sz="2400" dirty="0" smtClean="0"/>
-              <a:t>Balance conflicts and preferences</a:t>
-            </a:r>
-          </a:p>
-          <a:p>
-            <a:pPr marL="285750" indent="-285750">
-              <a:buFont typeface="Arial" panose="020B0604020202020204" pitchFamily="34" charset="0"/>
-              <a:buChar char="•"/>
-            </a:pPr>
+              <a:t>Initial Arrangement: [0,1,2,3,4,5,6,7,8,9,10,11,12,13,14,15,16,17,18,19]</a:t>
+            </a:r>
+          </a:p>
+          <a:p>
+            <a:endParaRPr lang="en-US" sz="2400" dirty="0"/>
+          </a:p>
+          <a:p>
             <a:r>
               <a:rPr lang="en-US" sz="2400" dirty="0" smtClean="0"/>
-              <a:t>Badness calculator could use some tweaking based on preferences</a:t>
-            </a:r>
-          </a:p>
-          <a:p>
-            <a:pPr marL="285750" indent="-285750">
-              <a:buFont typeface="Arial" panose="020B0604020202020204" pitchFamily="34" charset="0"/>
-              <a:buChar char="•"/>
-            </a:pPr>
+              <a:t>Final Badness: 14973</a:t>
+            </a:r>
+          </a:p>
+          <a:p>
             <a:r>
               <a:rPr lang="en-US" sz="2400" dirty="0" smtClean="0"/>
-              <a:t>Did not add a space constraint</a:t>
-            </a:r>
-          </a:p>
-          <a:p>
-            <a:pPr marL="285750" indent="-285750">
-              <a:buFont typeface="Arial" panose="020B0604020202020204" pitchFamily="34" charset="0"/>
-              <a:buChar char="•"/>
-            </a:pPr>
+              <a:t>Final Arrangement: [4,19,12,17,0,7,1,13,8,5,10,2,11,14,9,15,16,3,18,6]</a:t>
+            </a:r>
+          </a:p>
+          <a:p>
+            <a:endParaRPr lang="en-US" sz="2400" dirty="0"/>
+          </a:p>
+          <a:p>
             <a:r>
               <a:rPr lang="en-US" sz="2400" dirty="0" smtClean="0"/>
-              <a:t>Assigned slots based on start time – divide up the hours better</a:t>
-            </a:r>
+              <a:t>Without creating any new conflicts</a:t>
+            </a:r>
+            <a:endParaRPr lang="en-US" sz="2400" dirty="0"/>
           </a:p>
         </p:txBody>
       </p:sp>
     </p:spTree>
     <p:extLst>
       <p:ext uri="{BB962C8B-B14F-4D97-AF65-F5344CB8AC3E}">
-        <p14:creationId xmlns:p14="http://schemas.microsoft.com/office/powerpoint/2010/main" val="3060804143"/>
+        <p14:creationId xmlns:p14="http://schemas.microsoft.com/office/powerpoint/2010/main" val="3623456588"/>
       </p:ext>
     </p:extLst>
   </p:cSld>
   <p:clrMapOvr>
     <a:masterClrMapping/>
   </p:clrMapOvr>
+  <p:timing>
+    <p:tnLst>
+      <p:par>
+        <p:cTn id="1" dur="indefinite" restart="never" nodeType="tmRoot"/>
+      </p:par>
+    </p:tnLst>
+  </p:timing>
 </p:sld>
 </file>
 
@@ -6594,6 +6575,147 @@
       </p:grpSpPr>
       <p:sp>
         <p:nvSpPr>
+          <p:cNvPr id="3" name="TextBox 2"/>
+          <p:cNvSpPr txBox="1"/>
+          <p:nvPr/>
+        </p:nvSpPr>
+        <p:spPr>
+          <a:xfrm>
+            <a:off x="2688608" y="764273"/>
+            <a:ext cx="6619164" cy="646331"/>
+          </a:xfrm>
+          <a:prstGeom prst="rect">
+            <a:avLst/>
+          </a:prstGeom>
+          <a:noFill/>
+        </p:spPr>
+        <p:txBody>
+          <a:bodyPr wrap="square" rtlCol="0">
+            <a:spAutoFit/>
+          </a:bodyPr>
+          <a:lstStyle/>
+          <a:p>
+            <a:pPr algn="ctr"/>
+            <a:r>
+              <a:rPr lang="en-US" sz="3600" dirty="0" smtClean="0"/>
+              <a:t>Improvements to  be made</a:t>
+            </a:r>
+            <a:endParaRPr lang="en-US" sz="3600" dirty="0"/>
+          </a:p>
+        </p:txBody>
+      </p:sp>
+      <p:sp>
+        <p:nvSpPr>
+          <p:cNvPr id="4" name="TextBox 3"/>
+          <p:cNvSpPr txBox="1"/>
+          <p:nvPr/>
+        </p:nvSpPr>
+        <p:spPr>
+          <a:xfrm>
+            <a:off x="2470245" y="1787857"/>
+            <a:ext cx="7547212" cy="2677656"/>
+          </a:xfrm>
+          <a:prstGeom prst="rect">
+            <a:avLst/>
+          </a:prstGeom>
+          <a:noFill/>
+        </p:spPr>
+        <p:txBody>
+          <a:bodyPr wrap="square" rtlCol="0">
+            <a:spAutoFit/>
+          </a:bodyPr>
+          <a:lstStyle/>
+          <a:p>
+            <a:pPr marL="285750" indent="-285750">
+              <a:buFont typeface="Arial" panose="020B0604020202020204" pitchFamily="34" charset="0"/>
+              <a:buChar char="•"/>
+            </a:pPr>
+            <a:r>
+              <a:rPr lang="en-US" sz="2400" dirty="0" smtClean="0"/>
+              <a:t>More efficient</a:t>
+            </a:r>
+          </a:p>
+          <a:p>
+            <a:pPr marL="285750" indent="-285750">
+              <a:buFont typeface="Arial" panose="020B0604020202020204" pitchFamily="34" charset="0"/>
+              <a:buChar char="•"/>
+            </a:pPr>
+            <a:r>
+              <a:rPr lang="en-US" sz="2400" dirty="0" smtClean="0"/>
+              <a:t>Balance conflicts and preferences</a:t>
+            </a:r>
+          </a:p>
+          <a:p>
+            <a:pPr marL="285750" indent="-285750">
+              <a:buFont typeface="Arial" panose="020B0604020202020204" pitchFamily="34" charset="0"/>
+              <a:buChar char="•"/>
+            </a:pPr>
+            <a:r>
+              <a:rPr lang="en-US" sz="2400" dirty="0" smtClean="0"/>
+              <a:t>Badness calculator could use some tweaking based on preferences</a:t>
+            </a:r>
+          </a:p>
+          <a:p>
+            <a:pPr marL="285750" indent="-285750">
+              <a:buFont typeface="Arial" panose="020B0604020202020204" pitchFamily="34" charset="0"/>
+              <a:buChar char="•"/>
+            </a:pPr>
+            <a:r>
+              <a:rPr lang="en-US" sz="2400" dirty="0" smtClean="0"/>
+              <a:t>Did not add a space constraint</a:t>
+            </a:r>
+          </a:p>
+          <a:p>
+            <a:pPr marL="285750" indent="-285750">
+              <a:buFont typeface="Arial" panose="020B0604020202020204" pitchFamily="34" charset="0"/>
+              <a:buChar char="•"/>
+            </a:pPr>
+            <a:r>
+              <a:rPr lang="en-US" sz="2400" dirty="0" smtClean="0"/>
+              <a:t>Assigned slots based on start time – divide up the hours better</a:t>
+            </a:r>
+          </a:p>
+        </p:txBody>
+      </p:sp>
+    </p:spTree>
+    <p:extLst>
+      <p:ext uri="{BB962C8B-B14F-4D97-AF65-F5344CB8AC3E}">
+        <p14:creationId xmlns:p14="http://schemas.microsoft.com/office/powerpoint/2010/main" val="3060804143"/>
+      </p:ext>
+    </p:extLst>
+  </p:cSld>
+  <p:clrMapOvr>
+    <a:masterClrMapping/>
+  </p:clrMapOvr>
+  <p:timing>
+    <p:tnLst>
+      <p:par>
+        <p:cTn id="1" dur="indefinite" restart="never" nodeType="tmRoot"/>
+      </p:par>
+    </p:tnLst>
+  </p:timing>
+</p:sld>
+</file>
+
+<file path=ppt/slides/slide14.xml><?xml version="1.0" encoding="utf-8"?>
+<p:sld xmlns:a="http://schemas.openxmlformats.org/drawingml/2006/main" xmlns:r="http://schemas.openxmlformats.org/officeDocument/2006/relationships" xmlns:p="http://schemas.openxmlformats.org/presentationml/2006/main">
+  <p:cSld>
+    <p:spTree>
+      <p:nvGrpSpPr>
+        <p:cNvPr id="1" name=""/>
+        <p:cNvGrpSpPr/>
+        <p:nvPr/>
+      </p:nvGrpSpPr>
+      <p:grpSpPr>
+        <a:xfrm>
+          <a:off x="0" y="0"/>
+          <a:ext cx="0" cy="0"/>
+          <a:chOff x="0" y="0"/>
+          <a:chExt cx="0" cy="0"/>
+        </a:xfrm>
+      </p:grpSpPr>
+      <p:sp>
+        <p:nvSpPr>
           <p:cNvPr id="2" name="TextBox 1"/>
           <p:cNvSpPr txBox="1"/>
           <p:nvPr/>
@@ -6692,6 +6814,13 @@
   <p:clrMapOvr>
     <a:masterClrMapping/>
   </p:clrMapOvr>
+  <p:timing>
+    <p:tnLst>
+      <p:par>
+        <p:cTn id="1" dur="indefinite" restart="never" nodeType="tmRoot"/>
+      </p:par>
+    </p:tnLst>
+  </p:timing>
 </p:sld>
 </file>
 

</xml_diff>